<commit_message>
v2.0 Build 1: Code komplett umstrukturiert, weitere Verbesserungen
</commit_message>
<xml_diff>
--- a/media/main_menu.pptx
+++ b/media/main_menu.pptx
@@ -192,7 +192,7 @@
           <a:p>
             <a:fld id="{705C5509-B3E4-45DA-9104-8DF8D7F6CEF1}" type="datetimeFigureOut">
               <a:rPr lang="de-DE" smtClean="0"/>
-              <a:t>08.05.2011</a:t>
+              <a:t>02.05.2012</a:t>
             </a:fld>
             <a:endParaRPr lang="de-DE"/>
           </a:p>
@@ -730,7 +730,7 @@
           <a:p>
             <a:fld id="{2715F926-88BB-46E0-BB9D-DA931720B69B}" type="datetimeFigureOut">
               <a:rPr lang="de-DE" smtClean="0"/>
-              <a:t>08.05.2011</a:t>
+              <a:t>02.05.2012</a:t>
             </a:fld>
             <a:endParaRPr lang="de-DE"/>
           </a:p>
@@ -900,7 +900,7 @@
           <a:p>
             <a:fld id="{2715F926-88BB-46E0-BB9D-DA931720B69B}" type="datetimeFigureOut">
               <a:rPr lang="de-DE" smtClean="0"/>
-              <a:t>08.05.2011</a:t>
+              <a:t>02.05.2012</a:t>
             </a:fld>
             <a:endParaRPr lang="de-DE"/>
           </a:p>
@@ -1080,7 +1080,7 @@
           <a:p>
             <a:fld id="{2715F926-88BB-46E0-BB9D-DA931720B69B}" type="datetimeFigureOut">
               <a:rPr lang="de-DE" smtClean="0"/>
-              <a:t>08.05.2011</a:t>
+              <a:t>02.05.2012</a:t>
             </a:fld>
             <a:endParaRPr lang="de-DE"/>
           </a:p>
@@ -1250,7 +1250,7 @@
           <a:p>
             <a:fld id="{2715F926-88BB-46E0-BB9D-DA931720B69B}" type="datetimeFigureOut">
               <a:rPr lang="de-DE" smtClean="0"/>
-              <a:t>08.05.2011</a:t>
+              <a:t>02.05.2012</a:t>
             </a:fld>
             <a:endParaRPr lang="de-DE"/>
           </a:p>
@@ -1496,7 +1496,7 @@
           <a:p>
             <a:fld id="{2715F926-88BB-46E0-BB9D-DA931720B69B}" type="datetimeFigureOut">
               <a:rPr lang="de-DE" smtClean="0"/>
-              <a:t>08.05.2011</a:t>
+              <a:t>02.05.2012</a:t>
             </a:fld>
             <a:endParaRPr lang="de-DE"/>
           </a:p>
@@ -1784,7 +1784,7 @@
           <a:p>
             <a:fld id="{2715F926-88BB-46E0-BB9D-DA931720B69B}" type="datetimeFigureOut">
               <a:rPr lang="de-DE" smtClean="0"/>
-              <a:t>08.05.2011</a:t>
+              <a:t>02.05.2012</a:t>
             </a:fld>
             <a:endParaRPr lang="de-DE"/>
           </a:p>
@@ -2211,7 +2211,7 @@
           <a:p>
             <a:fld id="{2715F926-88BB-46E0-BB9D-DA931720B69B}" type="datetimeFigureOut">
               <a:rPr lang="de-DE" smtClean="0"/>
-              <a:t>08.05.2011</a:t>
+              <a:t>02.05.2012</a:t>
             </a:fld>
             <a:endParaRPr lang="de-DE"/>
           </a:p>
@@ -2329,7 +2329,7 @@
           <a:p>
             <a:fld id="{2715F926-88BB-46E0-BB9D-DA931720B69B}" type="datetimeFigureOut">
               <a:rPr lang="de-DE" smtClean="0"/>
-              <a:t>08.05.2011</a:t>
+              <a:t>02.05.2012</a:t>
             </a:fld>
             <a:endParaRPr lang="de-DE"/>
           </a:p>
@@ -2424,7 +2424,7 @@
           <a:p>
             <a:fld id="{2715F926-88BB-46E0-BB9D-DA931720B69B}" type="datetimeFigureOut">
               <a:rPr lang="de-DE" smtClean="0"/>
-              <a:t>08.05.2011</a:t>
+              <a:t>02.05.2012</a:t>
             </a:fld>
             <a:endParaRPr lang="de-DE"/>
           </a:p>
@@ -2701,7 +2701,7 @@
           <a:p>
             <a:fld id="{2715F926-88BB-46E0-BB9D-DA931720B69B}" type="datetimeFigureOut">
               <a:rPr lang="de-DE" smtClean="0"/>
-              <a:t>08.05.2011</a:t>
+              <a:t>02.05.2012</a:t>
             </a:fld>
             <a:endParaRPr lang="de-DE"/>
           </a:p>
@@ -2954,7 +2954,7 @@
           <a:p>
             <a:fld id="{2715F926-88BB-46E0-BB9D-DA931720B69B}" type="datetimeFigureOut">
               <a:rPr lang="de-DE" smtClean="0"/>
-              <a:t>08.05.2011</a:t>
+              <a:t>02.05.2012</a:t>
             </a:fld>
             <a:endParaRPr lang="de-DE"/>
           </a:p>
@@ -3167,7 +3167,7 @@
           <a:p>
             <a:fld id="{2715F926-88BB-46E0-BB9D-DA931720B69B}" type="datetimeFigureOut">
               <a:rPr lang="de-DE" smtClean="0"/>
-              <a:t>08.05.2011</a:t>
+              <a:t>02.05.2012</a:t>
             </a:fld>
             <a:endParaRPr lang="de-DE"/>
           </a:p>
@@ -3765,31 +3765,120 @@
           </a:prstGeom>
         </p:spPr>
       </p:pic>
-      <p:sp>
-        <p:nvSpPr>
-          <p:cNvPr id="19" name="Rechteck 18"/>
-          <p:cNvSpPr/>
+      <p:grpSp>
+        <p:nvGrpSpPr>
+          <p:cNvPr id="4" name="Gruppieren 3"/>
+          <p:cNvGrpSpPr/>
           <p:nvPr/>
-        </p:nvSpPr>
-        <p:spPr>
+        </p:nvGrpSpPr>
+        <p:grpSpPr>
           <a:xfrm>
-            <a:off x="10091611" y="2537985"/>
-            <a:ext cx="1939377" cy="923330"/>
+            <a:off x="6897277" y="2153022"/>
+            <a:ext cx="5155257" cy="4176464"/>
+            <a:chOff x="6897277" y="2009006"/>
+            <a:chExt cx="5155257" cy="4176464"/>
           </a:xfrm>
-          <a:prstGeom prst="rect">
-            <a:avLst/>
-          </a:prstGeom>
-          <a:noFill/>
-        </p:spPr>
-        <p:txBody>
-          <a:bodyPr wrap="none" lIns="91440" tIns="45720" rIns="91440" bIns="45720">
-            <a:spAutoFit/>
-          </a:bodyPr>
-          <a:lstStyle/>
-          <a:p>
-            <a:pPr algn="ctr"/>
-            <a:r>
-              <a:rPr lang="de-DE" sz="5400" b="1" cap="none" spc="0" dirty="0" smtClean="0">
+        </p:grpSpPr>
+        <p:sp>
+          <p:nvSpPr>
+            <p:cNvPr id="19" name="Rechteck 18"/>
+            <p:cNvSpPr/>
+            <p:nvPr/>
+          </p:nvSpPr>
+          <p:spPr>
+            <a:xfrm>
+              <a:off x="10087826" y="2009006"/>
+              <a:ext cx="1939377" cy="923330"/>
+            </a:xfrm>
+            <a:prstGeom prst="rect">
+              <a:avLst/>
+            </a:prstGeom>
+            <a:noFill/>
+          </p:spPr>
+          <p:txBody>
+            <a:bodyPr wrap="none" lIns="91440" tIns="45720" rIns="91440" bIns="45720">
+              <a:spAutoFit/>
+            </a:bodyPr>
+            <a:lstStyle/>
+            <a:p>
+              <a:pPr algn="ctr"/>
+              <a:r>
+                <a:rPr lang="de-DE" sz="5400" b="1" cap="none" spc="0" dirty="0" smtClean="0">
+                  <a:ln w="19050">
+                    <a:solidFill>
+                      <a:schemeClr val="accent6">
+                        <a:lumMod val="60000"/>
+                        <a:lumOff val="40000"/>
+                      </a:schemeClr>
+                    </a:solidFill>
+                    <a:prstDash val="solid"/>
+                  </a:ln>
+                  <a:solidFill>
+                    <a:srgbClr val="00B050"/>
+                  </a:solidFill>
+                  <a:effectLst>
+                    <a:outerShdw blurRad="50000" dist="50800" dir="7500000" algn="tl">
+                      <a:srgbClr val="000000">
+                        <a:shade val="5000"/>
+                        <a:alpha val="35000"/>
+                      </a:srgbClr>
+                    </a:outerShdw>
+                  </a:effectLst>
+                </a:rPr>
+                <a:t>START</a:t>
+              </a:r>
+            </a:p>
+          </p:txBody>
+        </p:sp>
+        <p:sp>
+          <p:nvSpPr>
+            <p:cNvPr id="20" name="Rechteck 19"/>
+            <p:cNvSpPr/>
+            <p:nvPr/>
+          </p:nvSpPr>
+          <p:spPr>
+            <a:xfrm>
+              <a:off x="6897277" y="4471243"/>
+              <a:ext cx="5155257" cy="923330"/>
+            </a:xfrm>
+            <a:prstGeom prst="rect">
+              <a:avLst/>
+            </a:prstGeom>
+            <a:noFill/>
+          </p:spPr>
+          <p:txBody>
+            <a:bodyPr wrap="none" lIns="91440" tIns="45720" rIns="91440" bIns="45720">
+              <a:spAutoFit/>
+            </a:bodyPr>
+            <a:lstStyle/>
+            <a:p>
+              <a:pPr algn="ctr"/>
+              <a:r>
+                <a:rPr lang="de-DE" sz="5400" b="1" dirty="0" smtClean="0">
+                  <a:ln w="19050">
+                    <a:solidFill>
+                      <a:schemeClr val="accent6">
+                        <a:lumMod val="60000"/>
+                        <a:lumOff val="40000"/>
+                      </a:schemeClr>
+                    </a:solidFill>
+                    <a:prstDash val="solid"/>
+                  </a:ln>
+                  <a:solidFill>
+                    <a:srgbClr val="00B050"/>
+                  </a:solidFill>
+                  <a:effectLst>
+                    <a:outerShdw blurRad="50000" dist="50800" dir="7500000" algn="tl">
+                      <a:srgbClr val="000000">
+                        <a:shade val="5000"/>
+                        <a:alpha val="35000"/>
+                      </a:srgbClr>
+                    </a:outerShdw>
+                  </a:effectLst>
+                </a:rPr>
+                <a:t>CHANGE PROFILE</a:t>
+              </a:r>
+              <a:endParaRPr lang="de-DE" sz="5400" b="1" cap="none" spc="0" dirty="0" smtClean="0">
                 <a:ln w="19050">
                   <a:solidFill>
                     <a:schemeClr val="accent6">
@@ -3810,37 +3899,59 @@
                     </a:srgbClr>
                   </a:outerShdw>
                 </a:effectLst>
-              </a:rPr>
-              <a:t>START</a:t>
-            </a:r>
-          </a:p>
-        </p:txBody>
-      </p:sp>
-      <p:sp>
-        <p:nvSpPr>
-          <p:cNvPr id="20" name="Rechteck 19"/>
-          <p:cNvSpPr/>
-          <p:nvPr/>
-        </p:nvSpPr>
-        <p:spPr>
-          <a:xfrm>
-            <a:off x="6897277" y="4338810"/>
-            <a:ext cx="5155257" cy="923330"/>
-          </a:xfrm>
-          <a:prstGeom prst="rect">
-            <a:avLst/>
-          </a:prstGeom>
-          <a:noFill/>
-        </p:spPr>
-        <p:txBody>
-          <a:bodyPr wrap="none" lIns="91440" tIns="45720" rIns="91440" bIns="45720">
-            <a:spAutoFit/>
-          </a:bodyPr>
-          <a:lstStyle/>
-          <a:p>
-            <a:pPr algn="ctr"/>
-            <a:r>
-              <a:rPr lang="de-DE" sz="5400" b="1" dirty="0" smtClean="0">
+              </a:endParaRPr>
+            </a:p>
+          </p:txBody>
+        </p:sp>
+        <p:sp>
+          <p:nvSpPr>
+            <p:cNvPr id="21" name="Rechteck 20"/>
+            <p:cNvSpPr/>
+            <p:nvPr/>
+          </p:nvSpPr>
+          <p:spPr>
+            <a:xfrm>
+              <a:off x="8823958" y="3665190"/>
+              <a:ext cx="3228576" cy="923330"/>
+            </a:xfrm>
+            <a:prstGeom prst="rect">
+              <a:avLst/>
+            </a:prstGeom>
+            <a:noFill/>
+          </p:spPr>
+          <p:txBody>
+            <a:bodyPr wrap="none" lIns="91440" tIns="45720" rIns="91440" bIns="45720">
+              <a:spAutoFit/>
+            </a:bodyPr>
+            <a:lstStyle/>
+            <a:p>
+              <a:pPr algn="ctr"/>
+              <a:r>
+                <a:rPr lang="de-DE" sz="5400" b="1" dirty="0" smtClean="0">
+                  <a:ln w="19050">
+                    <a:solidFill>
+                      <a:schemeClr val="accent6">
+                        <a:lumMod val="60000"/>
+                        <a:lumOff val="40000"/>
+                      </a:schemeClr>
+                    </a:solidFill>
+                    <a:prstDash val="solid"/>
+                  </a:ln>
+                  <a:solidFill>
+                    <a:srgbClr val="00B050"/>
+                  </a:solidFill>
+                  <a:effectLst>
+                    <a:outerShdw blurRad="50000" dist="50800" dir="7500000" algn="tl">
+                      <a:srgbClr val="000000">
+                        <a:shade val="5000"/>
+                        <a:alpha val="35000"/>
+                      </a:srgbClr>
+                    </a:outerShdw>
+                  </a:effectLst>
+                </a:rPr>
+                <a:t>STATISTICS</a:t>
+              </a:r>
+              <a:endParaRPr lang="de-DE" sz="5400" b="1" cap="none" spc="0" dirty="0" smtClean="0">
                 <a:ln w="19050">
                   <a:solidFill>
                     <a:schemeClr val="accent6">
@@ -3861,59 +3972,59 @@
                     </a:srgbClr>
                   </a:outerShdw>
                 </a:effectLst>
-              </a:rPr>
-              <a:t>CHANGE PROFILE</a:t>
-            </a:r>
-            <a:endParaRPr lang="de-DE" sz="5400" b="1" cap="none" spc="0" dirty="0" smtClean="0">
-              <a:ln w="19050">
-                <a:solidFill>
-                  <a:schemeClr val="accent6">
-                    <a:lumMod val="60000"/>
-                    <a:lumOff val="40000"/>
-                  </a:schemeClr>
-                </a:solidFill>
-                <a:prstDash val="solid"/>
-              </a:ln>
-              <a:solidFill>
-                <a:srgbClr val="00B050"/>
-              </a:solidFill>
-              <a:effectLst>
-                <a:outerShdw blurRad="50000" dist="50800" dir="7500000" algn="tl">
-                  <a:srgbClr val="000000">
-                    <a:shade val="5000"/>
-                    <a:alpha val="35000"/>
-                  </a:srgbClr>
-                </a:outerShdw>
-              </a:effectLst>
-            </a:endParaRPr>
-          </a:p>
-        </p:txBody>
-      </p:sp>
-      <p:sp>
-        <p:nvSpPr>
-          <p:cNvPr id="21" name="Rechteck 20"/>
-          <p:cNvSpPr/>
-          <p:nvPr/>
-        </p:nvSpPr>
-        <p:spPr>
-          <a:xfrm>
-            <a:off x="8845675" y="3460422"/>
-            <a:ext cx="3228576" cy="923330"/>
-          </a:xfrm>
-          <a:prstGeom prst="rect">
-            <a:avLst/>
-          </a:prstGeom>
-          <a:noFill/>
-        </p:spPr>
-        <p:txBody>
-          <a:bodyPr wrap="none" lIns="91440" tIns="45720" rIns="91440" bIns="45720">
-            <a:spAutoFit/>
-          </a:bodyPr>
-          <a:lstStyle/>
-          <a:p>
-            <a:pPr algn="ctr"/>
-            <a:r>
-              <a:rPr lang="de-DE" sz="5400" b="1" dirty="0" smtClean="0">
+              </a:endParaRPr>
+            </a:p>
+          </p:txBody>
+        </p:sp>
+        <p:sp>
+          <p:nvSpPr>
+            <p:cNvPr id="22" name="Rechteck 21"/>
+            <p:cNvSpPr/>
+            <p:nvPr/>
+          </p:nvSpPr>
+          <p:spPr>
+            <a:xfrm>
+              <a:off x="10272655" y="5262140"/>
+              <a:ext cx="1638590" cy="923330"/>
+            </a:xfrm>
+            <a:prstGeom prst="rect">
+              <a:avLst/>
+            </a:prstGeom>
+            <a:noFill/>
+          </p:spPr>
+          <p:txBody>
+            <a:bodyPr wrap="none" lIns="91440" tIns="45720" rIns="91440" bIns="45720">
+              <a:spAutoFit/>
+            </a:bodyPr>
+            <a:lstStyle/>
+            <a:p>
+              <a:pPr algn="ctr"/>
+              <a:r>
+                <a:rPr lang="de-DE" sz="5400" b="1" dirty="0" smtClean="0">
+                  <a:ln w="19050">
+                    <a:solidFill>
+                      <a:schemeClr val="accent6">
+                        <a:lumMod val="60000"/>
+                        <a:lumOff val="40000"/>
+                      </a:schemeClr>
+                    </a:solidFill>
+                    <a:prstDash val="solid"/>
+                  </a:ln>
+                  <a:solidFill>
+                    <a:srgbClr val="00B050"/>
+                  </a:solidFill>
+                  <a:effectLst>
+                    <a:outerShdw blurRad="50000" dist="50800" dir="7500000" algn="tl">
+                      <a:srgbClr val="000000">
+                        <a:shade val="5000"/>
+                        <a:alpha val="35000"/>
+                      </a:srgbClr>
+                    </a:outerShdw>
+                  </a:effectLst>
+                </a:rPr>
+                <a:t>QUIT</a:t>
+              </a:r>
+              <a:endParaRPr lang="de-DE" sz="5400" b="1" cap="none" spc="0" dirty="0" smtClean="0">
                 <a:ln w="19050">
                   <a:solidFill>
                     <a:schemeClr val="accent6">
@@ -3934,59 +4045,59 @@
                     </a:srgbClr>
                   </a:outerShdw>
                 </a:effectLst>
-              </a:rPr>
-              <a:t>STATISTICS</a:t>
-            </a:r>
-            <a:endParaRPr lang="de-DE" sz="5400" b="1" cap="none" spc="0" dirty="0" smtClean="0">
-              <a:ln w="19050">
-                <a:solidFill>
-                  <a:schemeClr val="accent6">
-                    <a:lumMod val="60000"/>
-                    <a:lumOff val="40000"/>
-                  </a:schemeClr>
-                </a:solidFill>
-                <a:prstDash val="solid"/>
-              </a:ln>
-              <a:solidFill>
-                <a:srgbClr val="00B050"/>
-              </a:solidFill>
-              <a:effectLst>
-                <a:outerShdw blurRad="50000" dist="50800" dir="7500000" algn="tl">
-                  <a:srgbClr val="000000">
-                    <a:shade val="5000"/>
-                    <a:alpha val="35000"/>
-                  </a:srgbClr>
-                </a:outerShdw>
-              </a:effectLst>
-            </a:endParaRPr>
-          </a:p>
-        </p:txBody>
-      </p:sp>
-      <p:sp>
-        <p:nvSpPr>
-          <p:cNvPr id="22" name="Rechteck 21"/>
-          <p:cNvSpPr/>
-          <p:nvPr/>
-        </p:nvSpPr>
-        <p:spPr>
-          <a:xfrm>
-            <a:off x="10272655" y="5262140"/>
-            <a:ext cx="1638590" cy="923330"/>
-          </a:xfrm>
-          <a:prstGeom prst="rect">
-            <a:avLst/>
-          </a:prstGeom>
-          <a:noFill/>
-        </p:spPr>
-        <p:txBody>
-          <a:bodyPr wrap="none" lIns="91440" tIns="45720" rIns="91440" bIns="45720">
-            <a:spAutoFit/>
-          </a:bodyPr>
-          <a:lstStyle/>
-          <a:p>
-            <a:pPr algn="ctr"/>
-            <a:r>
-              <a:rPr lang="de-DE" sz="5400" b="1" dirty="0" smtClean="0">
+              </a:endParaRPr>
+            </a:p>
+          </p:txBody>
+        </p:sp>
+        <p:sp>
+          <p:nvSpPr>
+            <p:cNvPr id="11" name="Rechteck 10"/>
+            <p:cNvSpPr/>
+            <p:nvPr/>
+          </p:nvSpPr>
+          <p:spPr>
+            <a:xfrm>
+              <a:off x="9064383" y="2825978"/>
+              <a:ext cx="2974918" cy="923330"/>
+            </a:xfrm>
+            <a:prstGeom prst="rect">
+              <a:avLst/>
+            </a:prstGeom>
+            <a:noFill/>
+          </p:spPr>
+          <p:txBody>
+            <a:bodyPr wrap="none" lIns="91440" tIns="45720" rIns="91440" bIns="45720">
+              <a:spAutoFit/>
+            </a:bodyPr>
+            <a:lstStyle/>
+            <a:p>
+              <a:pPr algn="ctr"/>
+              <a:r>
+                <a:rPr lang="de-DE" sz="5400" b="1" dirty="0" smtClean="0">
+                  <a:ln w="19050">
+                    <a:solidFill>
+                      <a:schemeClr val="accent6">
+                        <a:lumMod val="60000"/>
+                        <a:lumOff val="40000"/>
+                      </a:schemeClr>
+                    </a:solidFill>
+                    <a:prstDash val="solid"/>
+                  </a:ln>
+                  <a:solidFill>
+                    <a:srgbClr val="00B050"/>
+                  </a:solidFill>
+                  <a:effectLst>
+                    <a:outerShdw blurRad="50000" dist="50800" dir="7500000" algn="tl">
+                      <a:srgbClr val="000000">
+                        <a:shade val="5000"/>
+                        <a:alpha val="35000"/>
+                      </a:srgbClr>
+                    </a:outerShdw>
+                  </a:effectLst>
+                </a:rPr>
+                <a:t>VS-MODE</a:t>
+              </a:r>
+              <a:endParaRPr lang="de-DE" sz="5400" b="1" cap="none" spc="0" dirty="0" smtClean="0">
                 <a:ln w="19050">
                   <a:solidFill>
                     <a:schemeClr val="accent6">
@@ -4007,34 +4118,11 @@
                     </a:srgbClr>
                   </a:outerShdw>
                 </a:effectLst>
-              </a:rPr>
-              <a:t>QUIT</a:t>
-            </a:r>
-            <a:endParaRPr lang="de-DE" sz="5400" b="1" cap="none" spc="0" dirty="0" smtClean="0">
-              <a:ln w="19050">
-                <a:solidFill>
-                  <a:schemeClr val="accent6">
-                    <a:lumMod val="60000"/>
-                    <a:lumOff val="40000"/>
-                  </a:schemeClr>
-                </a:solidFill>
-                <a:prstDash val="solid"/>
-              </a:ln>
-              <a:solidFill>
-                <a:srgbClr val="00B050"/>
-              </a:solidFill>
-              <a:effectLst>
-                <a:outerShdw blurRad="50000" dist="50800" dir="7500000" algn="tl">
-                  <a:srgbClr val="000000">
-                    <a:shade val="5000"/>
-                    <a:alpha val="35000"/>
-                  </a:srgbClr>
-                </a:outerShdw>
-              </a:effectLst>
-            </a:endParaRPr>
-          </a:p>
-        </p:txBody>
-      </p:sp>
+              </a:endParaRPr>
+            </a:p>
+          </p:txBody>
+        </p:sp>
+      </p:grpSp>
     </p:spTree>
     <p:extLst>
       <p:ext uri="{BB962C8B-B14F-4D97-AF65-F5344CB8AC3E}">

</xml_diff>